<commit_message>
Presentación Semana 1 - Commit FINAL
</commit_message>
<xml_diff>
--- a/Semana 1/PresentacionSemana1.pptx
+++ b/Semana 1/PresentacionSemana1.pptx
@@ -5,7 +5,7 @@
     <p:sldMasterId id="2147483648" r:id="rId1"/>
   </p:sldMasterIdLst>
   <p:notesMasterIdLst>
-    <p:notesMasterId r:id="rId11"/>
+    <p:notesMasterId r:id="rId12"/>
   </p:notesMasterIdLst>
   <p:sldIdLst>
     <p:sldId id="256" r:id="rId2"/>
@@ -17,50 +17,51 @@
     <p:sldId id="271" r:id="rId8"/>
     <p:sldId id="272" r:id="rId9"/>
     <p:sldId id="273" r:id="rId10"/>
+    <p:sldId id="275" r:id="rId11"/>
   </p:sldIdLst>
   <p:sldSz cx="12192000" cy="6858000"/>
   <p:notesSz cx="6858000" cy="9144000"/>
   <p:embeddedFontLst>
     <p:embeddedFont>
       <p:font typeface="Bahnschrift SemiBold Condensed" panose="020B0502040204020203" pitchFamily="34" charset="0"/>
-      <p:bold r:id="rId12"/>
+      <p:bold r:id="rId13"/>
     </p:embeddedFont>
     <p:embeddedFont>
       <p:font typeface="Bodoni MT" panose="02070603080606020203" pitchFamily="18" charset="0"/>
-      <p:regular r:id="rId13"/>
-      <p:bold r:id="rId14"/>
-      <p:italic r:id="rId15"/>
-      <p:boldItalic r:id="rId16"/>
+      <p:regular r:id="rId14"/>
+      <p:bold r:id="rId15"/>
+      <p:italic r:id="rId16"/>
+      <p:boldItalic r:id="rId17"/>
     </p:embeddedFont>
     <p:embeddedFont>
       <p:font typeface="Calibri" panose="020F0502020204030204" pitchFamily="34" charset="0"/>
-      <p:regular r:id="rId17"/>
-      <p:bold r:id="rId18"/>
-      <p:italic r:id="rId19"/>
-      <p:boldItalic r:id="rId20"/>
+      <p:regular r:id="rId18"/>
+      <p:bold r:id="rId19"/>
+      <p:italic r:id="rId20"/>
+      <p:boldItalic r:id="rId21"/>
     </p:embeddedFont>
     <p:embeddedFont>
       <p:font typeface="Eras Medium ITC" panose="020B0602030504020804" pitchFamily="34" charset="0"/>
-      <p:regular r:id="rId21"/>
+      <p:regular r:id="rId22"/>
     </p:embeddedFont>
     <p:embeddedFont>
       <p:font typeface="Impact" panose="020B0806030902050204" pitchFamily="34" charset="0"/>
-      <p:regular r:id="rId22"/>
+      <p:regular r:id="rId23"/>
     </p:embeddedFont>
     <p:embeddedFont>
       <p:font typeface="Montserrat" panose="00000500000000000000" pitchFamily="2" charset="0"/>
-      <p:regular r:id="rId23"/>
-      <p:bold r:id="rId24"/>
-      <p:italic r:id="rId25"/>
-      <p:boldItalic r:id="rId26"/>
+      <p:regular r:id="rId24"/>
+      <p:bold r:id="rId25"/>
+      <p:italic r:id="rId26"/>
+      <p:boldItalic r:id="rId27"/>
     </p:embeddedFont>
     <p:embeddedFont>
       <p:font typeface="Open Sans" panose="020B0606030504020204" pitchFamily="34" charset="0"/>
-      <p:regular r:id="rId27"/>
+      <p:regular r:id="rId28"/>
     </p:embeddedFont>
     <p:embeddedFont>
       <p:font typeface="Rage Italic" panose="03070502040507070304" pitchFamily="66" charset="0"/>
-      <p:regular r:id="rId28"/>
+      <p:regular r:id="rId29"/>
     </p:embeddedFont>
   </p:embeddedFontLst>
   <p:defaultTextStyle>
@@ -310,6 +311,7 @@
             <p14:sldId id="271"/>
             <p14:sldId id="272"/>
             <p14:sldId id="273"/>
+            <p14:sldId id="275"/>
           </p14:sldIdLst>
         </p14:section>
       </p14:sectionLst>
@@ -329,7 +331,7 @@
       </p15:sldGuideLst>
     </p:ext>
     <p:ext uri="http://customooxmlschemas.google.com/">
-      <go:slidesCustomData xmlns:go="http://customooxmlschemas.google.com/" xmlns:ahyp="http://schemas.microsoft.com/office/drawing/2018/hyperlinkcolor" xmlns:p15="http://schemas.microsoft.com/office/powerpoint/2012/main" xmlns:p14="http://schemas.microsoft.com/office/powerpoint/2010/main" xmlns:com="http://schemas.openxmlformats.org/drawingml/2006/compatibility" xmlns:pvml="urn:schemas-microsoft-com:office:powerpoint" xmlns:v="urn:schemas-microsoft-com:vml" xmlns:o="urn:schemas-microsoft-com:office:office" xmlns:dgm="http://schemas.openxmlformats.org/drawingml/2006/diagram" xmlns:c="http://schemas.openxmlformats.org/drawingml/2006/chart" xmlns:mv="urn:schemas-microsoft-com:mac:vml" xmlns:mc="http://schemas.openxmlformats.org/markup-compatibility/2006" xmlns="" r:id="rId29" roundtripDataSignature="AMtx7mh2UdHDYLoZmMjgSD47Ve8WfxIycA=="/>
+      <go:slidesCustomData xmlns="" xmlns:mc="http://schemas.openxmlformats.org/markup-compatibility/2006" xmlns:mv="urn:schemas-microsoft-com:mac:vml" xmlns:c="http://schemas.openxmlformats.org/drawingml/2006/chart" xmlns:dgm="http://schemas.openxmlformats.org/drawingml/2006/diagram" xmlns:o="urn:schemas-microsoft-com:office:office" xmlns:v="urn:schemas-microsoft-com:vml" xmlns:pvml="urn:schemas-microsoft-com:office:powerpoint" xmlns:com="http://schemas.openxmlformats.org/drawingml/2006/compatibility" xmlns:p14="http://schemas.microsoft.com/office/powerpoint/2010/main" xmlns:p15="http://schemas.microsoft.com/office/powerpoint/2012/main" xmlns:ahyp="http://schemas.microsoft.com/office/drawing/2018/hyperlinkcolor" xmlns:go="http://customooxmlschemas.google.com/" r:id="rId30" roundtripDataSignature="AMtx7mh2UdHDYLoZmMjgSD47Ve8WfxIycA=="/>
     </p:ext>
   </p:extLst>
 </p:presentation>
@@ -12823,6 +12825,138 @@
 </p:sld>
 </file>
 
+<file path=ppt/slides/slide10.xml><?xml version="1.0" encoding="utf-8"?>
+<p:sld xmlns:a="http://schemas.openxmlformats.org/drawingml/2006/main" xmlns:r="http://schemas.openxmlformats.org/officeDocument/2006/relationships" xmlns:p="http://schemas.openxmlformats.org/presentationml/2006/main">
+  <p:cSld>
+    <p:bg>
+      <p:bgPr>
+        <a:solidFill>
+          <a:srgbClr val="00838F"/>
+        </a:solidFill>
+        <a:effectLst/>
+      </p:bgPr>
+    </p:bg>
+    <p:spTree>
+      <p:nvGrpSpPr>
+        <p:cNvPr id="1" name=""/>
+        <p:cNvGrpSpPr/>
+        <p:nvPr/>
+      </p:nvGrpSpPr>
+      <p:grpSpPr>
+        <a:xfrm>
+          <a:off x="0" y="0"/>
+          <a:ext cx="0" cy="0"/>
+          <a:chOff x="0" y="0"/>
+          <a:chExt cx="0" cy="0"/>
+        </a:xfrm>
+      </p:grpSpPr>
+      <p:sp>
+        <p:nvSpPr>
+          <p:cNvPr id="2" name="Google Shape;87;p1">
+            <a:extLst>
+              <a:ext uri="{FF2B5EF4-FFF2-40B4-BE49-F238E27FC236}">
+                <a16:creationId xmlns:a16="http://schemas.microsoft.com/office/drawing/2014/main" id="{4EB59451-510A-C5AA-26D7-8070899415EA}"/>
+              </a:ext>
+            </a:extLst>
+          </p:cNvPr>
+          <p:cNvSpPr txBox="1"/>
+          <p:nvPr/>
+        </p:nvSpPr>
+        <p:spPr>
+          <a:xfrm>
+            <a:off x="960449" y="1905526"/>
+            <a:ext cx="7376727" cy="3046948"/>
+          </a:xfrm>
+          <a:prstGeom prst="rect">
+            <a:avLst/>
+          </a:prstGeom>
+          <a:noFill/>
+          <a:ln>
+            <a:noFill/>
+          </a:ln>
+          <a:effectLst>
+            <a:outerShdw blurRad="50800" dist="38100" dir="5400000" algn="t" rotWithShape="0">
+              <a:prstClr val="black">
+                <a:alpha val="40000"/>
+              </a:prstClr>
+            </a:outerShdw>
+          </a:effectLst>
+        </p:spPr>
+        <p:txBody>
+          <a:bodyPr spcFirstLastPara="1" wrap="square" lIns="91425" tIns="45700" rIns="91425" bIns="45700" anchor="t" anchorCtr="0">
+            <a:spAutoFit/>
+          </a:bodyPr>
+          <a:lstStyle/>
+          <a:p>
+            <a:pPr marL="0" marR="0" lvl="0" indent="0" algn="l" rtl="0">
+              <a:spcBef>
+                <a:spcPts val="0"/>
+              </a:spcBef>
+              <a:spcAft>
+                <a:spcPts val="0"/>
+              </a:spcAft>
+              <a:buNone/>
+            </a:pPr>
+            <a:r>
+              <a:rPr lang="es-ES" sz="9600" dirty="0">
+                <a:solidFill>
+                  <a:schemeClr val="lt1"/>
+                </a:solidFill>
+                <a:latin typeface="Bahnschrift SemiBold Condensed" panose="020B0502040204020203" pitchFamily="34" charset="0"/>
+                <a:ea typeface="Impact"/>
+                <a:cs typeface="Impact"/>
+                <a:sym typeface="Impact"/>
+              </a:rPr>
+              <a:t>PREGUNTAS</a:t>
+            </a:r>
+          </a:p>
+          <a:p>
+            <a:pPr marL="0" marR="0" lvl="0" indent="0" algn="l" rtl="0">
+              <a:spcBef>
+                <a:spcPts val="0"/>
+              </a:spcBef>
+              <a:spcAft>
+                <a:spcPts val="0"/>
+              </a:spcAft>
+              <a:buNone/>
+            </a:pPr>
+            <a:r>
+              <a:rPr lang="es-ES" sz="9600" dirty="0">
+                <a:solidFill>
+                  <a:schemeClr val="lt1"/>
+                </a:solidFill>
+                <a:latin typeface="Bahnschrift SemiBold Condensed" panose="020B0502040204020203" pitchFamily="34" charset="0"/>
+                <a:ea typeface="Impact"/>
+                <a:cs typeface="Impact"/>
+                <a:sym typeface="Impact"/>
+              </a:rPr>
+              <a:t>Y RESPUESTAS </a:t>
+            </a:r>
+            <a:endParaRPr sz="9600" dirty="0">
+              <a:solidFill>
+                <a:schemeClr val="lt1"/>
+              </a:solidFill>
+              <a:latin typeface="Bahnschrift SemiBold Condensed" panose="020B0502040204020203" pitchFamily="34" charset="0"/>
+              <a:ea typeface="Impact"/>
+              <a:cs typeface="Impact"/>
+              <a:sym typeface="Impact"/>
+            </a:endParaRPr>
+          </a:p>
+        </p:txBody>
+      </p:sp>
+    </p:spTree>
+    <p:extLst>
+      <p:ext uri="{BB962C8B-B14F-4D97-AF65-F5344CB8AC3E}">
+        <p14:creationId xmlns:p14="http://schemas.microsoft.com/office/powerpoint/2010/main" val="1229401574"/>
+      </p:ext>
+    </p:extLst>
+  </p:cSld>
+  <p:clrMapOvr>
+    <a:masterClrMapping/>
+  </p:clrMapOvr>
+</p:sld>
+</file>
+
 <file path=ppt/slides/slide2.xml><?xml version="1.0" encoding="utf-8"?>
 <p:sld xmlns:a="http://schemas.openxmlformats.org/drawingml/2006/main" xmlns:r="http://schemas.openxmlformats.org/officeDocument/2006/relationships" xmlns:p="http://schemas.openxmlformats.org/presentationml/2006/main">
   <p:cSld>
@@ -16707,6 +16841,53 @@
           </a:p>
         </p:txBody>
       </p:sp>
+      <p:pic>
+        <p:nvPicPr>
+          <p:cNvPr id="2" name="Picture 2">
+            <a:extLst>
+              <a:ext uri="{FF2B5EF4-FFF2-40B4-BE49-F238E27FC236}">
+                <a16:creationId xmlns:a16="http://schemas.microsoft.com/office/drawing/2014/main" id="{6155F47F-D899-E2EA-C3BF-1B22E0D9BCDE}"/>
+              </a:ext>
+            </a:extLst>
+          </p:cNvPr>
+          <p:cNvPicPr>
+            <a:picLocks noChangeAspect="1" noChangeArrowheads="1"/>
+          </p:cNvPicPr>
+          <p:nvPr/>
+        </p:nvPicPr>
+        <p:blipFill>
+          <a:blip r:embed="rId7">
+            <a:extLst>
+              <a:ext uri="{28A0092B-C50C-407E-A947-70E740481C1C}">
+                <a14:useLocalDpi xmlns:a14="http://schemas.microsoft.com/office/drawing/2010/main" val="0"/>
+              </a:ext>
+            </a:extLst>
+          </a:blip>
+          <a:srcRect/>
+          <a:stretch>
+            <a:fillRect/>
+          </a:stretch>
+        </p:blipFill>
+        <p:spPr bwMode="auto">
+          <a:xfrm>
+            <a:off x="6108026" y="296116"/>
+            <a:ext cx="1997310" cy="2035173"/>
+          </a:xfrm>
+          <a:prstGeom prst="rect">
+            <a:avLst/>
+          </a:prstGeom>
+          <a:noFill/>
+          <a:extLst>
+            <a:ext uri="{909E8E84-426E-40DD-AFC4-6F175D3DCCD1}">
+              <a14:hiddenFill xmlns:a14="http://schemas.microsoft.com/office/drawing/2010/main">
+                <a:solidFill>
+                  <a:srgbClr val="FFFFFF"/>
+                </a:solidFill>
+              </a14:hiddenFill>
+            </a:ext>
+          </a:extLst>
+        </p:spPr>
+      </p:pic>
     </p:spTree>
     <p:extLst>
       <p:ext uri="{BB962C8B-B14F-4D97-AF65-F5344CB8AC3E}">
@@ -16766,7 +16947,7 @@
                                           </p:stCondLst>
                                         </p:cTn>
                                         <p:tgtEl>
-                                          <p:spTgt spid="122"/>
+                                          <p:spTgt spid="124"/>
                                         </p:tgtEl>
                                         <p:attrNameLst>
                                           <p:attrName>style.visibility</p:attrName>
@@ -16778,9 +16959,9 @@
                                     </p:set>
                                     <p:animEffect transition="in" filter="fade">
                                       <p:cBhvr>
-                                        <p:cTn id="7" dur="500"/>
+                                        <p:cTn id="7" dur="250"/>
                                         <p:tgtEl>
-                                          <p:spTgt spid="122"/>
+                                          <p:spTgt spid="124"/>
                                         </p:tgtEl>
                                       </p:cBhvr>
                                     </p:animEffect>
@@ -16801,41 +16982,6 @@
                                           </p:stCondLst>
                                         </p:cTn>
                                         <p:tgtEl>
-                                          <p:spTgt spid="124"/>
-                                        </p:tgtEl>
-                                        <p:attrNameLst>
-                                          <p:attrName>style.visibility</p:attrName>
-                                        </p:attrNameLst>
-                                      </p:cBhvr>
-                                      <p:to>
-                                        <p:strVal val="visible"/>
-                                      </p:to>
-                                    </p:set>
-                                    <p:animEffect transition="in" filter="fade">
-                                      <p:cBhvr>
-                                        <p:cTn id="10" dur="250"/>
-                                        <p:tgtEl>
-                                          <p:spTgt spid="124"/>
-                                        </p:tgtEl>
-                                      </p:cBhvr>
-                                    </p:animEffect>
-                                  </p:childTnLst>
-                                </p:cTn>
-                              </p:par>
-                              <p:par>
-                                <p:cTn id="11" presetID="10" presetClass="entr" presetSubtype="0" fill="hold" nodeType="withEffect">
-                                  <p:stCondLst>
-                                    <p:cond delay="0"/>
-                                  </p:stCondLst>
-                                  <p:childTnLst>
-                                    <p:set>
-                                      <p:cBhvr>
-                                        <p:cTn id="12" dur="1" fill="hold">
-                                          <p:stCondLst>
-                                            <p:cond delay="0"/>
-                                          </p:stCondLst>
-                                        </p:cTn>
-                                        <p:tgtEl>
                                           <p:spTgt spid="125"/>
                                         </p:tgtEl>
                                         <p:attrNameLst>
@@ -16848,7 +16994,7 @@
                                     </p:set>
                                     <p:animEffect transition="in" filter="fade">
                                       <p:cBhvr>
-                                        <p:cTn id="13" dur="500"/>
+                                        <p:cTn id="10" dur="500"/>
                                         <p:tgtEl>
                                           <p:spTgt spid="125"/>
                                         </p:tgtEl>

</xml_diff>